<commit_message>
Changes from after testing, required documents added
</commit_message>
<xml_diff>
--- a/Documents/Laker Books Presentation.pptx
+++ b/Documents/Laker Books Presentation.pptx
@@ -9,6 +9,8 @@
     <p:sldId id="257" r:id="rId3"/>
     <p:sldId id="256" r:id="rId4"/>
     <p:sldId id="262" r:id="rId5"/>
+    <p:sldId id="263" r:id="rId6"/>
+    <p:sldId id="264" r:id="rId7"/>
   </p:sldIdLst>
   <p:sldSz cx="9144000" cy="6858000" type="screen4x3"/>
   <p:notesSz cx="6858000" cy="9144000"/>
@@ -304,7 +306,7 @@
             <a:fld id="{451DEABC-D766-4322-8E78-B830FAE35C72}" type="datetime4">
               <a:rPr lang="en-US" smtClean="0"/>
               <a:pPr/>
-              <a:t>December 5, 2015</a:t>
+              <a:t>December 8, 2015</a:t>
             </a:fld>
             <a:endParaRPr lang="en-US" dirty="0"/>
           </a:p>
@@ -571,7 +573,7 @@
             <a:fld id="{F3131F9E-604E-4343-9F29-EF72E8231CAD}" type="datetime4">
               <a:rPr lang="en-US" smtClean="0"/>
               <a:pPr/>
-              <a:t>December 5, 2015</a:t>
+              <a:t>December 8, 2015</a:t>
             </a:fld>
             <a:endParaRPr lang="en-US"/>
           </a:p>
@@ -748,7 +750,7 @@
             <a:fld id="{34A8E1CE-37F8-4102-8DF9-852A0A51F293}" type="datetime4">
               <a:rPr lang="en-US" smtClean="0"/>
               <a:pPr/>
-              <a:t>December 5, 2015</a:t>
+              <a:t>December 8, 2015</a:t>
             </a:fld>
             <a:endParaRPr lang="en-US"/>
           </a:p>
@@ -915,7 +917,7 @@
             <a:fld id="{93333F43-3E86-47E4-BFBB-2476D384E1C6}" type="datetime4">
               <a:rPr lang="en-US" smtClean="0"/>
               <a:pPr/>
-              <a:t>December 5, 2015</a:t>
+              <a:t>December 8, 2015</a:t>
             </a:fld>
             <a:endParaRPr lang="en-US"/>
           </a:p>
@@ -1166,7 +1168,7 @@
             <a:fld id="{751663BA-01FC-4367-B6F3-ABB2645D55F1}" type="datetime4">
               <a:rPr lang="en-US" smtClean="0"/>
               <a:pPr/>
-              <a:t>December 5, 2015</a:t>
+              <a:t>December 8, 2015</a:t>
             </a:fld>
             <a:endParaRPr lang="en-US" dirty="0"/>
           </a:p>
@@ -1451,7 +1453,7 @@
             <a:fld id="{79B19C71-EC74-44AF-B27E-FC7DC3C3A61D}" type="datetime4">
               <a:rPr lang="en-US" smtClean="0"/>
               <a:pPr/>
-              <a:t>December 5, 2015</a:t>
+              <a:t>December 8, 2015</a:t>
             </a:fld>
             <a:endParaRPr lang="en-US"/>
           </a:p>
@@ -1892,7 +1894,7 @@
             <a:fld id="{6A5CDA29-3CBE-48EA-92AE-A996835462BA}" type="datetime4">
               <a:rPr lang="en-US" smtClean="0"/>
               <a:pPr/>
-              <a:t>December 5, 2015</a:t>
+              <a:t>December 8, 2015</a:t>
             </a:fld>
             <a:endParaRPr lang="en-US"/>
           </a:p>
@@ -2007,7 +2009,7 @@
             <a:fld id="{E29EC054-3869-4501-B163-1BBFDE8DCE04}" type="datetime4">
               <a:rPr lang="en-US" smtClean="0"/>
               <a:pPr/>
-              <a:t>December 5, 2015</a:t>
+              <a:t>December 8, 2015</a:t>
             </a:fld>
             <a:endParaRPr lang="en-US"/>
           </a:p>
@@ -2099,7 +2101,7 @@
             <a:fld id="{0A63D831-56C1-49CF-8EF7-8B9A98402BCD}" type="datetime4">
               <a:rPr lang="en-US" smtClean="0"/>
               <a:pPr/>
-              <a:t>December 5, 2015</a:t>
+              <a:t>December 8, 2015</a:t>
             </a:fld>
             <a:endParaRPr lang="en-US"/>
           </a:p>
@@ -2343,7 +2345,7 @@
             <a:fld id="{6EAD5615-7F4F-4584-84D5-CC95918C321F}" type="datetime4">
               <a:rPr lang="en-US" smtClean="0"/>
               <a:pPr/>
-              <a:t>December 5, 2015</a:t>
+              <a:t>December 8, 2015</a:t>
             </a:fld>
             <a:endParaRPr lang="en-US"/>
           </a:p>
@@ -2639,7 +2641,7 @@
             <a:fld id="{76EEA923-9BEE-48CE-9F28-5B525F399BAD}" type="datetime4">
               <a:rPr lang="en-US" smtClean="0"/>
               <a:pPr/>
-              <a:t>December 5, 2015</a:t>
+              <a:t>December 8, 2015</a:t>
             </a:fld>
             <a:endParaRPr lang="en-US"/>
           </a:p>
@@ -2935,7 +2937,7 @@
             <a:fld id="{17D0EFEE-2756-4A20-BF2A-63F0A94F99AC}" type="datetime4">
               <a:rPr lang="en-US" smtClean="0"/>
               <a:pPr/>
-              <a:t>December 5, 2015</a:t>
+              <a:t>December 8, 2015</a:t>
             </a:fld>
             <a:endParaRPr lang="en-US" dirty="0"/>
           </a:p>
@@ -4113,7 +4115,33 @@
                 <a:latin typeface="Steinem"/>
                 <a:cs typeface="Steinem"/>
               </a:rPr>
-              <a:t>No registration </a:t>
+              <a:t>No </a:t>
+            </a:r>
+            <a:r>
+              <a:rPr lang="en-US" sz="2400" b="0" dirty="0" smtClean="0">
+                <a:solidFill>
+                  <a:srgbClr val="FFFFFF"/>
+                </a:solidFill>
+                <a:latin typeface="Steinem"/>
+                <a:cs typeface="Steinem"/>
+              </a:rPr>
+              <a:t>registration</a:t>
+            </a:r>
+          </a:p>
+          <a:p>
+            <a:pPr marL="342900" indent="-342900">
+              <a:buFont typeface="Arial"/>
+              <a:buChar char="•"/>
+            </a:pPr>
+            <a:r>
+              <a:rPr lang="en-US" sz="2400" b="0" dirty="0" smtClean="0">
+                <a:solidFill>
+                  <a:srgbClr val="FFFFFF"/>
+                </a:solidFill>
+                <a:latin typeface="Steinem"/>
+                <a:cs typeface="Steinem"/>
+              </a:rPr>
+              <a:t>Can be used on a variety of devices </a:t>
             </a:r>
             <a:endParaRPr lang="en-US" sz="2400" b="0" dirty="0" smtClean="0">
               <a:solidFill>
@@ -4155,6 +4183,261 @@
     <p:extLst>
       <p:ext uri="{BB962C8B-B14F-4D97-AF65-F5344CB8AC3E}">
         <p14:creationId xmlns:p14="http://schemas.microsoft.com/office/powerpoint/2010/main" val="3463740109"/>
+      </p:ext>
+    </p:extLst>
+  </p:cSld>
+  <p:clrMapOvr>
+    <a:masterClrMapping/>
+  </p:clrMapOvr>
+</p:sld>
+</file>
+
+<file path=ppt/slides/slide5.xml><?xml version="1.0" encoding="utf-8"?>
+<p:sld xmlns:a="http://schemas.openxmlformats.org/drawingml/2006/main" xmlns:r="http://schemas.openxmlformats.org/officeDocument/2006/relationships" xmlns:p="http://schemas.openxmlformats.org/presentationml/2006/main">
+  <p:cSld>
+    <p:bg>
+      <p:bgPr>
+        <a:solidFill>
+          <a:schemeClr val="bg1"/>
+        </a:solidFill>
+        <a:effectLst/>
+      </p:bgPr>
+    </p:bg>
+    <p:spTree>
+      <p:nvGrpSpPr>
+        <p:cNvPr id="1" name=""/>
+        <p:cNvGrpSpPr/>
+        <p:nvPr/>
+      </p:nvGrpSpPr>
+      <p:grpSpPr>
+        <a:xfrm>
+          <a:off x="0" y="0"/>
+          <a:ext cx="0" cy="0"/>
+          <a:chOff x="0" y="0"/>
+          <a:chExt cx="0" cy="0"/>
+        </a:xfrm>
+      </p:grpSpPr>
+      <p:sp>
+        <p:nvSpPr>
+          <p:cNvPr id="3" name="TextBox 2"/>
+          <p:cNvSpPr txBox="1"/>
+          <p:nvPr/>
+        </p:nvSpPr>
+        <p:spPr>
+          <a:xfrm>
+            <a:off x="418188" y="681540"/>
+            <a:ext cx="3206112" cy="523220"/>
+          </a:xfrm>
+          <a:prstGeom prst="rect">
+            <a:avLst/>
+          </a:prstGeom>
+          <a:noFill/>
+        </p:spPr>
+        <p:txBody>
+          <a:bodyPr wrap="square" rtlCol="0">
+            <a:spAutoFit/>
+          </a:bodyPr>
+          <a:lstStyle/>
+          <a:p>
+            <a:r>
+              <a:rPr lang="en-US" sz="2800" dirty="0" smtClean="0">
+                <a:latin typeface="Steinem"/>
+                <a:cs typeface="Steinem"/>
+              </a:rPr>
+              <a:t>Computer</a:t>
+            </a:r>
+            <a:endParaRPr lang="en-US" sz="2800" dirty="0">
+              <a:latin typeface="Steinem"/>
+              <a:cs typeface="Steinem"/>
+            </a:endParaRPr>
+          </a:p>
+        </p:txBody>
+      </p:sp>
+      <p:sp>
+        <p:nvSpPr>
+          <p:cNvPr id="4" name="TextBox 3"/>
+          <p:cNvSpPr txBox="1"/>
+          <p:nvPr/>
+        </p:nvSpPr>
+        <p:spPr>
+          <a:xfrm>
+            <a:off x="5635316" y="681540"/>
+            <a:ext cx="3206112" cy="523220"/>
+          </a:xfrm>
+          <a:prstGeom prst="rect">
+            <a:avLst/>
+          </a:prstGeom>
+          <a:noFill/>
+        </p:spPr>
+        <p:txBody>
+          <a:bodyPr wrap="square" rtlCol="0">
+            <a:spAutoFit/>
+          </a:bodyPr>
+          <a:lstStyle/>
+          <a:p>
+            <a:r>
+              <a:rPr lang="en-US" sz="2800" dirty="0" smtClean="0">
+                <a:solidFill>
+                  <a:srgbClr val="000000"/>
+                </a:solidFill>
+                <a:latin typeface="Steinem"/>
+                <a:cs typeface="Steinem"/>
+              </a:rPr>
+              <a:t>Mobile Device</a:t>
+            </a:r>
+            <a:endParaRPr lang="en-US" sz="2800" dirty="0">
+              <a:solidFill>
+                <a:srgbClr val="000000"/>
+              </a:solidFill>
+              <a:latin typeface="Steinem"/>
+              <a:cs typeface="Steinem"/>
+            </a:endParaRPr>
+          </a:p>
+        </p:txBody>
+      </p:sp>
+      <p:pic>
+        <p:nvPicPr>
+          <p:cNvPr id="5" name="Picture 4" descr="Screen Shot 2015-12-08 at 9.53.24 PM.png"/>
+          <p:cNvPicPr>
+            <a:picLocks noChangeAspect="1"/>
+          </p:cNvPicPr>
+          <p:nvPr/>
+        </p:nvPicPr>
+        <p:blipFill>
+          <a:blip r:embed="rId2" cstate="print">
+            <a:extLst>
+              <a:ext uri="{28A0092B-C50C-407E-A947-70E740481C1C}">
+                <a14:useLocalDpi xmlns:a14="http://schemas.microsoft.com/office/drawing/2010/main" val="0"/>
+              </a:ext>
+            </a:extLst>
+          </a:blip>
+          <a:stretch>
+            <a:fillRect/>
+          </a:stretch>
+        </p:blipFill>
+        <p:spPr>
+          <a:xfrm>
+            <a:off x="263303" y="1657252"/>
+            <a:ext cx="4605881" cy="4859848"/>
+          </a:xfrm>
+          <a:prstGeom prst="rect">
+            <a:avLst/>
+          </a:prstGeom>
+        </p:spPr>
+      </p:pic>
+      <p:pic>
+        <p:nvPicPr>
+          <p:cNvPr id="6" name="Picture 5" descr="Screen Shot 2015-12-08 at 9.53.54 PM.png"/>
+          <p:cNvPicPr>
+            <a:picLocks noChangeAspect="1"/>
+          </p:cNvPicPr>
+          <p:nvPr/>
+        </p:nvPicPr>
+        <p:blipFill>
+          <a:blip r:embed="rId3">
+            <a:extLst>
+              <a:ext uri="{28A0092B-C50C-407E-A947-70E740481C1C}">
+                <a14:useLocalDpi xmlns:a14="http://schemas.microsoft.com/office/drawing/2010/main" val="0"/>
+              </a:ext>
+            </a:extLst>
+          </a:blip>
+          <a:stretch>
+            <a:fillRect/>
+          </a:stretch>
+        </p:blipFill>
+        <p:spPr>
+          <a:xfrm>
+            <a:off x="5861933" y="1657252"/>
+            <a:ext cx="2731679" cy="4859848"/>
+          </a:xfrm>
+          <a:prstGeom prst="rect">
+            <a:avLst/>
+          </a:prstGeom>
+        </p:spPr>
+      </p:pic>
+    </p:spTree>
+    <p:extLst>
+      <p:ext uri="{BB962C8B-B14F-4D97-AF65-F5344CB8AC3E}">
+        <p14:creationId xmlns:p14="http://schemas.microsoft.com/office/powerpoint/2010/main" val="1206354314"/>
+      </p:ext>
+    </p:extLst>
+  </p:cSld>
+  <p:clrMapOvr>
+    <a:masterClrMapping/>
+  </p:clrMapOvr>
+</p:sld>
+</file>
+
+<file path=ppt/slides/slide6.xml><?xml version="1.0" encoding="utf-8"?>
+<p:sld xmlns:a="http://schemas.openxmlformats.org/drawingml/2006/main" xmlns:r="http://schemas.openxmlformats.org/officeDocument/2006/relationships" xmlns:p="http://schemas.openxmlformats.org/presentationml/2006/main">
+  <p:cSld>
+    <p:bg>
+      <p:bgPr>
+        <a:solidFill>
+          <a:srgbClr val="F95352"/>
+        </a:solidFill>
+        <a:effectLst/>
+      </p:bgPr>
+    </p:bg>
+    <p:spTree>
+      <p:nvGrpSpPr>
+        <p:cNvPr id="1" name=""/>
+        <p:cNvGrpSpPr/>
+        <p:nvPr/>
+      </p:nvGrpSpPr>
+      <p:grpSpPr>
+        <a:xfrm>
+          <a:off x="0" y="0"/>
+          <a:ext cx="0" cy="0"/>
+          <a:chOff x="0" y="0"/>
+          <a:chExt cx="0" cy="0"/>
+        </a:xfrm>
+      </p:grpSpPr>
+      <p:sp>
+        <p:nvSpPr>
+          <p:cNvPr id="2" name="Title 1"/>
+          <p:cNvSpPr>
+            <a:spLocks noGrp="1"/>
+          </p:cNvSpPr>
+          <p:nvPr>
+            <p:ph type="ctrTitle"/>
+          </p:nvPr>
+        </p:nvSpPr>
+        <p:spPr>
+          <a:xfrm>
+            <a:off x="1" y="0"/>
+            <a:ext cx="8983306" cy="6858000"/>
+          </a:xfrm>
+        </p:spPr>
+        <p:txBody>
+          <a:bodyPr/>
+          <a:lstStyle/>
+          <a:p>
+            <a:pPr algn="ctr"/>
+            <a:r>
+              <a:rPr lang="en-US" smtClean="0">
+                <a:solidFill>
+                  <a:srgbClr val="FFFFFF"/>
+                </a:solidFill>
+                <a:latin typeface="Steinem"/>
+                <a:cs typeface="Steinem"/>
+              </a:rPr>
+              <a:t>DEMO</a:t>
+            </a:r>
+            <a:endParaRPr lang="en-US" dirty="0">
+              <a:solidFill>
+                <a:srgbClr val="FFFFFF"/>
+              </a:solidFill>
+              <a:latin typeface="Steinem"/>
+              <a:cs typeface="Steinem"/>
+            </a:endParaRPr>
+          </a:p>
+        </p:txBody>
+      </p:sp>
+    </p:spTree>
+    <p:extLst>
+      <p:ext uri="{BB962C8B-B14F-4D97-AF65-F5344CB8AC3E}">
+        <p14:creationId xmlns:p14="http://schemas.microsoft.com/office/powerpoint/2010/main" val="1159871347"/>
       </p:ext>
     </p:extLst>
   </p:cSld>

</xml_diff>

<commit_message>
Small fixes and additions to presentation
</commit_message>
<xml_diff>
--- a/Documents/Laker Books Presentation.pptx
+++ b/Documents/Laker Books Presentation.pptx
@@ -10,7 +10,8 @@
     <p:sldId id="256" r:id="rId4"/>
     <p:sldId id="262" r:id="rId5"/>
     <p:sldId id="263" r:id="rId6"/>
-    <p:sldId id="264" r:id="rId7"/>
+    <p:sldId id="265" r:id="rId7"/>
+    <p:sldId id="264" r:id="rId8"/>
   </p:sldIdLst>
   <p:sldSz cx="9144000" cy="6858000" type="screen4x3"/>
   <p:notesSz cx="6858000" cy="9144000"/>
@@ -306,7 +307,7 @@
             <a:fld id="{451DEABC-D766-4322-8E78-B830FAE35C72}" type="datetime4">
               <a:rPr lang="en-US" smtClean="0"/>
               <a:pPr/>
-              <a:t>December 8, 2015</a:t>
+              <a:t>December 9, 2015</a:t>
             </a:fld>
             <a:endParaRPr lang="en-US" dirty="0"/>
           </a:p>
@@ -573,7 +574,7 @@
             <a:fld id="{F3131F9E-604E-4343-9F29-EF72E8231CAD}" type="datetime4">
               <a:rPr lang="en-US" smtClean="0"/>
               <a:pPr/>
-              <a:t>December 8, 2015</a:t>
+              <a:t>December 9, 2015</a:t>
             </a:fld>
             <a:endParaRPr lang="en-US"/>
           </a:p>
@@ -750,7 +751,7 @@
             <a:fld id="{34A8E1CE-37F8-4102-8DF9-852A0A51F293}" type="datetime4">
               <a:rPr lang="en-US" smtClean="0"/>
               <a:pPr/>
-              <a:t>December 8, 2015</a:t>
+              <a:t>December 9, 2015</a:t>
             </a:fld>
             <a:endParaRPr lang="en-US"/>
           </a:p>
@@ -917,7 +918,7 @@
             <a:fld id="{93333F43-3E86-47E4-BFBB-2476D384E1C6}" type="datetime4">
               <a:rPr lang="en-US" smtClean="0"/>
               <a:pPr/>
-              <a:t>December 8, 2015</a:t>
+              <a:t>December 9, 2015</a:t>
             </a:fld>
             <a:endParaRPr lang="en-US"/>
           </a:p>
@@ -1168,7 +1169,7 @@
             <a:fld id="{751663BA-01FC-4367-B6F3-ABB2645D55F1}" type="datetime4">
               <a:rPr lang="en-US" smtClean="0"/>
               <a:pPr/>
-              <a:t>December 8, 2015</a:t>
+              <a:t>December 9, 2015</a:t>
             </a:fld>
             <a:endParaRPr lang="en-US" dirty="0"/>
           </a:p>
@@ -1453,7 +1454,7 @@
             <a:fld id="{79B19C71-EC74-44AF-B27E-FC7DC3C3A61D}" type="datetime4">
               <a:rPr lang="en-US" smtClean="0"/>
               <a:pPr/>
-              <a:t>December 8, 2015</a:t>
+              <a:t>December 9, 2015</a:t>
             </a:fld>
             <a:endParaRPr lang="en-US"/>
           </a:p>
@@ -1894,7 +1895,7 @@
             <a:fld id="{6A5CDA29-3CBE-48EA-92AE-A996835462BA}" type="datetime4">
               <a:rPr lang="en-US" smtClean="0"/>
               <a:pPr/>
-              <a:t>December 8, 2015</a:t>
+              <a:t>December 9, 2015</a:t>
             </a:fld>
             <a:endParaRPr lang="en-US"/>
           </a:p>
@@ -2009,7 +2010,7 @@
             <a:fld id="{E29EC054-3869-4501-B163-1BBFDE8DCE04}" type="datetime4">
               <a:rPr lang="en-US" smtClean="0"/>
               <a:pPr/>
-              <a:t>December 8, 2015</a:t>
+              <a:t>December 9, 2015</a:t>
             </a:fld>
             <a:endParaRPr lang="en-US"/>
           </a:p>
@@ -2101,7 +2102,7 @@
             <a:fld id="{0A63D831-56C1-49CF-8EF7-8B9A98402BCD}" type="datetime4">
               <a:rPr lang="en-US" smtClean="0"/>
               <a:pPr/>
-              <a:t>December 8, 2015</a:t>
+              <a:t>December 9, 2015</a:t>
             </a:fld>
             <a:endParaRPr lang="en-US"/>
           </a:p>
@@ -2345,7 +2346,7 @@
             <a:fld id="{6EAD5615-7F4F-4584-84D5-CC95918C321F}" type="datetime4">
               <a:rPr lang="en-US" smtClean="0"/>
               <a:pPr/>
-              <a:t>December 8, 2015</a:t>
+              <a:t>December 9, 2015</a:t>
             </a:fld>
             <a:endParaRPr lang="en-US"/>
           </a:p>
@@ -2641,7 +2642,7 @@
             <a:fld id="{76EEA923-9BEE-48CE-9F28-5B525F399BAD}" type="datetime4">
               <a:rPr lang="en-US" smtClean="0"/>
               <a:pPr/>
-              <a:t>December 8, 2015</a:t>
+              <a:t>December 9, 2015</a:t>
             </a:fld>
             <a:endParaRPr lang="en-US"/>
           </a:p>
@@ -2937,7 +2938,7 @@
             <a:fld id="{17D0EFEE-2756-4A20-BF2A-63F0A94F99AC}" type="datetime4">
               <a:rPr lang="en-US" smtClean="0"/>
               <a:pPr/>
-              <a:t>December 8, 2015</a:t>
+              <a:t>December 9, 2015</a:t>
             </a:fld>
             <a:endParaRPr lang="en-US" dirty="0"/>
           </a:p>
@@ -3568,7 +3569,7 @@
         </p:spPr>
         <p:txBody>
           <a:bodyPr>
-            <a:normAutofit/>
+            <a:normAutofit fontScale="92500" lnSpcReduction="20000"/>
           </a:bodyPr>
           <a:lstStyle/>
           <a:p>
@@ -3649,6 +3650,16 @@
               <a:buNone/>
             </a:pPr>
             <a:r>
+              <a:rPr lang="en-US" dirty="0">
+                <a:solidFill>
+                  <a:srgbClr val="FFFFFF"/>
+                </a:solidFill>
+                <a:latin typeface="Steinem"/>
+                <a:cs typeface="Steinem"/>
+              </a:rPr>
+              <a:t>	</a:t>
+            </a:r>
+            <a:r>
               <a:rPr lang="en-US" dirty="0" smtClean="0">
                 <a:solidFill>
                   <a:srgbClr val="FFFFFF"/>
@@ -3656,6 +3667,28 @@
                 <a:latin typeface="Steinem"/>
                 <a:cs typeface="Steinem"/>
               </a:rPr>
+              <a:t>-No need to ship the book anywhere</a:t>
+            </a:r>
+            <a:endParaRPr lang="en-US" dirty="0" smtClean="0">
+              <a:solidFill>
+                <a:srgbClr val="FFFFFF"/>
+              </a:solidFill>
+              <a:latin typeface="Steinem"/>
+              <a:cs typeface="Steinem"/>
+            </a:endParaRPr>
+          </a:p>
+          <a:p>
+            <a:pPr lvl="1" indent="0">
+              <a:buNone/>
+            </a:pPr>
+            <a:r>
+              <a:rPr lang="en-US" dirty="0" smtClean="0">
+                <a:solidFill>
+                  <a:srgbClr val="FFFFFF"/>
+                </a:solidFill>
+                <a:latin typeface="Steinem"/>
+                <a:cs typeface="Steinem"/>
+              </a:rPr>
               <a:t>Cons:</a:t>
             </a:r>
           </a:p>
@@ -3671,13 +3704,8 @@
                 <a:latin typeface="Steinem"/>
                 <a:cs typeface="Steinem"/>
               </a:rPr>
-              <a:t>	-Lose a lot of money when selling</a:t>
-            </a:r>
-          </a:p>
-          <a:p>
-            <a:pPr lvl="1" indent="0">
-              <a:buNone/>
-            </a:pPr>
+              <a:t>	-Lose a lot of money when </a:t>
+            </a:r>
             <a:r>
               <a:rPr lang="en-US" dirty="0" smtClean="0">
                 <a:solidFill>
@@ -3686,8 +3714,15 @@
                 <a:latin typeface="Steinem"/>
                 <a:cs typeface="Steinem"/>
               </a:rPr>
-              <a:t>	-Pay a lot of money when buying</a:t>
-            </a:r>
+              <a:t>selling or buying</a:t>
+            </a:r>
+            <a:endParaRPr lang="en-US" dirty="0" smtClean="0">
+              <a:solidFill>
+                <a:srgbClr val="FFFFFF"/>
+              </a:solidFill>
+              <a:latin typeface="Steinem"/>
+              <a:cs typeface="Steinem"/>
+            </a:endParaRPr>
           </a:p>
           <a:p>
             <a:pPr lvl="1" indent="0">
@@ -3737,6 +3772,16 @@
               <a:buNone/>
             </a:pPr>
             <a:r>
+              <a:rPr lang="en-US" dirty="0">
+                <a:solidFill>
+                  <a:srgbClr val="FFFFFF"/>
+                </a:solidFill>
+                <a:latin typeface="Steinem"/>
+                <a:cs typeface="Steinem"/>
+              </a:rPr>
+              <a:t>	</a:t>
+            </a:r>
+            <a:r>
               <a:rPr lang="en-US" dirty="0" smtClean="0">
                 <a:solidFill>
                   <a:srgbClr val="FFFFFF"/>
@@ -3744,7 +3789,7 @@
                 <a:latin typeface="Steinem"/>
                 <a:cs typeface="Steinem"/>
               </a:rPr>
-              <a:t>	-Buy cheaper and sell at higher price</a:t>
+              <a:t>-Lots of users to buy your book</a:t>
             </a:r>
           </a:p>
           <a:p>
@@ -3769,6 +3814,63 @@
                 <a:latin typeface="Steinem"/>
                 <a:cs typeface="Steinem"/>
               </a:rPr>
+              <a:t>-Lots of options when looking for a book to buy</a:t>
+            </a:r>
+          </a:p>
+          <a:p>
+            <a:pPr lvl="1" indent="0">
+              <a:buNone/>
+            </a:pPr>
+            <a:r>
+              <a:rPr lang="en-US" dirty="0">
+                <a:solidFill>
+                  <a:srgbClr val="FFFFFF"/>
+                </a:solidFill>
+                <a:latin typeface="Steinem"/>
+                <a:cs typeface="Steinem"/>
+              </a:rPr>
+              <a:t>	</a:t>
+            </a:r>
+            <a:r>
+              <a:rPr lang="en-US" dirty="0" smtClean="0">
+                <a:solidFill>
+                  <a:srgbClr val="FFFFFF"/>
+                </a:solidFill>
+                <a:latin typeface="Steinem"/>
+                <a:cs typeface="Steinem"/>
+              </a:rPr>
+              <a:t>-Lose less money by not having a middleman</a:t>
+            </a:r>
+            <a:endParaRPr lang="en-US" dirty="0" smtClean="0">
+              <a:solidFill>
+                <a:srgbClr val="FFFFFF"/>
+              </a:solidFill>
+              <a:latin typeface="Steinem"/>
+              <a:cs typeface="Steinem"/>
+            </a:endParaRPr>
+          </a:p>
+          <a:p>
+            <a:pPr lvl="1" indent="0">
+              <a:buNone/>
+            </a:pPr>
+            <a:r>
+              <a:rPr lang="en-US" dirty="0">
+                <a:solidFill>
+                  <a:srgbClr val="FFFFFF"/>
+                </a:solidFill>
+                <a:latin typeface="Steinem"/>
+                <a:cs typeface="Steinem"/>
+              </a:rPr>
+              <a:t>	</a:t>
+            </a:r>
+            <a:r>
+              <a:rPr lang="en-US" dirty="0" smtClean="0">
+                <a:solidFill>
+                  <a:srgbClr val="FFFFFF"/>
+                </a:solidFill>
+                <a:latin typeface="Steinem"/>
+                <a:cs typeface="Steinem"/>
+              </a:rPr>
               <a:t>-Done right from computer</a:t>
             </a:r>
           </a:p>
@@ -3814,8 +3916,50 @@
                 <a:latin typeface="Steinem"/>
                 <a:cs typeface="Steinem"/>
               </a:rPr>
-              <a:t>	-Slow process that requires personal information</a:t>
-            </a:r>
+              <a:t>	-Slow process that requires personal </a:t>
+            </a:r>
+            <a:r>
+              <a:rPr lang="en-US" dirty="0" smtClean="0">
+                <a:solidFill>
+                  <a:srgbClr val="FFFFFF"/>
+                </a:solidFill>
+                <a:latin typeface="Steinem"/>
+                <a:cs typeface="Steinem"/>
+              </a:rPr>
+              <a:t>information</a:t>
+            </a:r>
+          </a:p>
+          <a:p>
+            <a:pPr lvl="1" indent="0">
+              <a:buNone/>
+            </a:pPr>
+            <a:r>
+              <a:rPr lang="en-US" dirty="0">
+                <a:solidFill>
+                  <a:srgbClr val="FFFFFF"/>
+                </a:solidFill>
+                <a:latin typeface="Steinem"/>
+                <a:cs typeface="Steinem"/>
+              </a:rPr>
+              <a:t>	</a:t>
+            </a:r>
+            <a:r>
+              <a:rPr lang="en-US" dirty="0" smtClean="0">
+                <a:solidFill>
+                  <a:srgbClr val="FFFFFF"/>
+                </a:solidFill>
+                <a:latin typeface="Steinem"/>
+                <a:cs typeface="Steinem"/>
+              </a:rPr>
+              <a:t>-Have to usually pay shipping costs</a:t>
+            </a:r>
+            <a:endParaRPr lang="en-US" dirty="0" smtClean="0">
+              <a:solidFill>
+                <a:srgbClr val="FFFFFF"/>
+              </a:solidFill>
+              <a:latin typeface="Steinem"/>
+              <a:cs typeface="Steinem"/>
+            </a:endParaRPr>
           </a:p>
         </p:txBody>
       </p:sp>
@@ -4008,7 +4152,17 @@
                 <a:latin typeface="Steinem"/>
                 <a:cs typeface="Steinem"/>
               </a:rPr>
-              <a:t>Quick and simple process </a:t>
+              <a:t>Quick and simple </a:t>
+            </a:r>
+            <a:r>
+              <a:rPr lang="en-US" sz="2400" b="0" dirty="0" smtClean="0">
+                <a:solidFill>
+                  <a:srgbClr val="FFFFFF"/>
+                </a:solidFill>
+                <a:latin typeface="Steinem"/>
+                <a:cs typeface="Steinem"/>
+              </a:rPr>
+              <a:t>way to buy and sell textbooks from other SUNY Oswego students</a:t>
             </a:r>
             <a:endParaRPr lang="en-US" sz="2400" b="0" dirty="0">
               <a:solidFill>
@@ -4083,14 +4237,8 @@
                 <a:latin typeface="Steinem"/>
                 <a:cs typeface="Steinem"/>
               </a:rPr>
-              <a:t>Done right from computer</a:t>
-            </a:r>
-          </a:p>
-          <a:p>
-            <a:pPr marL="342900" indent="-342900">
-              <a:buFont typeface="Arial"/>
-              <a:buChar char="•"/>
-            </a:pPr>
+              <a:t>Done right from </a:t>
+            </a:r>
             <a:r>
               <a:rPr lang="en-US" sz="2400" b="0" dirty="0" smtClean="0">
                 <a:solidFill>
@@ -4099,49 +4247,7 @@
                 <a:latin typeface="Steinem"/>
                 <a:cs typeface="Steinem"/>
               </a:rPr>
-              <a:t>Only need to access website once</a:t>
-            </a:r>
-          </a:p>
-          <a:p>
-            <a:pPr marL="342900" indent="-342900">
-              <a:buFont typeface="Arial"/>
-              <a:buChar char="•"/>
-            </a:pPr>
-            <a:r>
-              <a:rPr lang="en-US" sz="2400" b="0" dirty="0">
-                <a:solidFill>
-                  <a:srgbClr val="FFFFFF"/>
-                </a:solidFill>
-                <a:latin typeface="Steinem"/>
-                <a:cs typeface="Steinem"/>
-              </a:rPr>
-              <a:t>No </a:t>
-            </a:r>
-            <a:r>
-              <a:rPr lang="en-US" sz="2400" b="0" dirty="0" smtClean="0">
-                <a:solidFill>
-                  <a:srgbClr val="FFFFFF"/>
-                </a:solidFill>
-                <a:latin typeface="Steinem"/>
-                <a:cs typeface="Steinem"/>
-              </a:rPr>
-              <a:t>registration</a:t>
-            </a:r>
-          </a:p>
-          <a:p>
-            <a:pPr marL="342900" indent="-342900">
-              <a:buFont typeface="Arial"/>
-              <a:buChar char="•"/>
-            </a:pPr>
-            <a:r>
-              <a:rPr lang="en-US" sz="2400" b="0" dirty="0" smtClean="0">
-                <a:solidFill>
-                  <a:srgbClr val="FFFFFF"/>
-                </a:solidFill>
-                <a:latin typeface="Steinem"/>
-                <a:cs typeface="Steinem"/>
-              </a:rPr>
-              <a:t>Can be used on a variety of devices </a:t>
+              <a:t>the comfort of your computer</a:t>
             </a:r>
             <a:endParaRPr lang="en-US" sz="2400" b="0" dirty="0" smtClean="0">
               <a:solidFill>
@@ -4150,6 +4256,64 @@
               <a:latin typeface="Steinem"/>
               <a:cs typeface="Steinem"/>
             </a:endParaRPr>
+          </a:p>
+          <a:p>
+            <a:pPr marL="342900" indent="-342900">
+              <a:buFont typeface="Arial"/>
+              <a:buChar char="•"/>
+            </a:pPr>
+            <a:r>
+              <a:rPr lang="en-US" sz="2400" b="0" dirty="0" smtClean="0">
+                <a:solidFill>
+                  <a:srgbClr val="FFFFFF"/>
+                </a:solidFill>
+                <a:latin typeface="Steinem"/>
+                <a:cs typeface="Steinem"/>
+              </a:rPr>
+              <a:t>Only need to access website once</a:t>
+            </a:r>
+          </a:p>
+          <a:p>
+            <a:pPr marL="342900" indent="-342900">
+              <a:buFont typeface="Arial"/>
+              <a:buChar char="•"/>
+            </a:pPr>
+            <a:r>
+              <a:rPr lang="en-US" sz="2400" b="0" dirty="0">
+                <a:solidFill>
+                  <a:srgbClr val="FFFFFF"/>
+                </a:solidFill>
+                <a:latin typeface="Steinem"/>
+                <a:cs typeface="Steinem"/>
+              </a:rPr>
+              <a:t>No </a:t>
+            </a:r>
+            <a:r>
+              <a:rPr lang="en-US" sz="2400" b="0" dirty="0" smtClean="0">
+                <a:solidFill>
+                  <a:srgbClr val="FFFFFF"/>
+                </a:solidFill>
+                <a:latin typeface="Steinem"/>
+                <a:cs typeface="Steinem"/>
+              </a:rPr>
+              <a:t>registration</a:t>
+            </a:r>
+          </a:p>
+          <a:p>
+            <a:pPr marL="342900" indent="-342900">
+              <a:buFont typeface="Arial"/>
+              <a:buChar char="•"/>
+            </a:pPr>
+            <a:r>
+              <a:rPr lang="en-US" sz="2400" b="0" dirty="0" smtClean="0">
+                <a:solidFill>
+                  <a:srgbClr val="FFFFFF"/>
+                </a:solidFill>
+                <a:latin typeface="Steinem"/>
+                <a:cs typeface="Steinem"/>
+              </a:rPr>
+              <a:t>Can be used on a variety of devices </a:t>
+            </a:r>
           </a:p>
           <a:p>
             <a:pPr marL="342900" indent="-342900">
@@ -4369,6 +4533,421 @@
 </file>
 
 <file path=ppt/slides/slide6.xml><?xml version="1.0" encoding="utf-8"?>
+<p:sld xmlns:a="http://schemas.openxmlformats.org/drawingml/2006/main" xmlns:r="http://schemas.openxmlformats.org/officeDocument/2006/relationships" xmlns:p="http://schemas.openxmlformats.org/presentationml/2006/main">
+  <p:cSld>
+    <p:bg>
+      <p:bgPr>
+        <a:solidFill>
+          <a:srgbClr val="F95352"/>
+        </a:solidFill>
+        <a:effectLst/>
+      </p:bgPr>
+    </p:bg>
+    <p:spTree>
+      <p:nvGrpSpPr>
+        <p:cNvPr id="1" name=""/>
+        <p:cNvGrpSpPr/>
+        <p:nvPr/>
+      </p:nvGrpSpPr>
+      <p:grpSpPr>
+        <a:xfrm>
+          <a:off x="0" y="0"/>
+          <a:ext cx="0" cy="0"/>
+          <a:chOff x="0" y="0"/>
+          <a:chExt cx="0" cy="0"/>
+        </a:xfrm>
+      </p:grpSpPr>
+      <p:sp>
+        <p:nvSpPr>
+          <p:cNvPr id="2" name="Title 1"/>
+          <p:cNvSpPr>
+            <a:spLocks noGrp="1"/>
+          </p:cNvSpPr>
+          <p:nvPr>
+            <p:ph type="title"/>
+          </p:nvPr>
+        </p:nvSpPr>
+        <p:spPr>
+          <a:xfrm>
+            <a:off x="457200" y="210512"/>
+            <a:ext cx="5791200" cy="687882"/>
+          </a:xfrm>
+        </p:spPr>
+        <p:txBody>
+          <a:bodyPr/>
+          <a:lstStyle/>
+          <a:p>
+            <a:r>
+              <a:rPr lang="en-US" dirty="0" smtClean="0">
+                <a:solidFill>
+                  <a:srgbClr val="FFFFFF"/>
+                </a:solidFill>
+                <a:latin typeface="Steinem"/>
+                <a:cs typeface="Steinem"/>
+              </a:rPr>
+              <a:t>Project Timeline</a:t>
+            </a:r>
+            <a:endParaRPr lang="en-US" dirty="0">
+              <a:solidFill>
+                <a:srgbClr val="FFFFFF"/>
+              </a:solidFill>
+              <a:latin typeface="Steinem"/>
+              <a:cs typeface="Steinem"/>
+            </a:endParaRPr>
+          </a:p>
+        </p:txBody>
+      </p:sp>
+      <p:sp>
+        <p:nvSpPr>
+          <p:cNvPr id="3" name="Content Placeholder 2"/>
+          <p:cNvSpPr>
+            <a:spLocks noGrp="1"/>
+          </p:cNvSpPr>
+          <p:nvPr>
+            <p:ph idx="1"/>
+          </p:nvPr>
+        </p:nvSpPr>
+        <p:spPr>
+          <a:xfrm>
+            <a:off x="457200" y="1318893"/>
+            <a:ext cx="7620000" cy="5682386"/>
+          </a:xfrm>
+        </p:spPr>
+        <p:txBody>
+          <a:bodyPr/>
+          <a:lstStyle/>
+          <a:p>
+            <a:pPr marL="342900" indent="-342900">
+              <a:buFont typeface="Arial"/>
+              <a:buChar char="•"/>
+            </a:pPr>
+            <a:r>
+              <a:rPr lang="en-US" sz="2400" b="0" dirty="0" smtClean="0">
+                <a:solidFill>
+                  <a:srgbClr val="FFFFFF"/>
+                </a:solidFill>
+                <a:latin typeface="Steinem"/>
+                <a:cs typeface="Steinem"/>
+              </a:rPr>
+              <a:t>September: </a:t>
+            </a:r>
+          </a:p>
+          <a:p>
+            <a:pPr marL="800100" lvl="1" indent="-342900">
+              <a:buFont typeface="Arial"/>
+              <a:buChar char="•"/>
+            </a:pPr>
+            <a:r>
+              <a:rPr lang="en-US" sz="2400" dirty="0" smtClean="0">
+                <a:solidFill>
+                  <a:srgbClr val="FFFFFF"/>
+                </a:solidFill>
+                <a:latin typeface="Steinem"/>
+                <a:cs typeface="Steinem"/>
+              </a:rPr>
+              <a:t>Initial planning</a:t>
+            </a:r>
+            <a:endParaRPr lang="en-US" sz="2400" b="0" dirty="0" smtClean="0">
+              <a:solidFill>
+                <a:srgbClr val="FFFFFF"/>
+              </a:solidFill>
+              <a:latin typeface="Steinem"/>
+              <a:cs typeface="Steinem"/>
+            </a:endParaRPr>
+          </a:p>
+          <a:p>
+            <a:pPr marL="800100" lvl="1" indent="-342900">
+              <a:buFont typeface="Arial"/>
+              <a:buChar char="•"/>
+            </a:pPr>
+            <a:r>
+              <a:rPr lang="en-US" sz="2400" b="0" dirty="0" smtClean="0">
+                <a:solidFill>
+                  <a:srgbClr val="FFFFFF"/>
+                </a:solidFill>
+                <a:latin typeface="Steinem"/>
+                <a:cs typeface="Steinem"/>
+              </a:rPr>
+              <a:t>Front end development (HTML, CSS</a:t>
+            </a:r>
+            <a:r>
+              <a:rPr lang="en-US" sz="2400" dirty="0" smtClean="0">
+                <a:solidFill>
+                  <a:srgbClr val="FFFFFF"/>
+                </a:solidFill>
+                <a:latin typeface="Steinem"/>
+                <a:cs typeface="Steinem"/>
+              </a:rPr>
+              <a:t>)</a:t>
+            </a:r>
+            <a:endParaRPr lang="en-US" sz="2400" b="0" dirty="0" smtClean="0">
+              <a:solidFill>
+                <a:srgbClr val="FFFFFF"/>
+              </a:solidFill>
+              <a:latin typeface="Steinem"/>
+              <a:cs typeface="Steinem"/>
+            </a:endParaRPr>
+          </a:p>
+          <a:p>
+            <a:pPr marL="800100" lvl="1" indent="-342900">
+              <a:buFont typeface="Arial"/>
+              <a:buChar char="•"/>
+            </a:pPr>
+            <a:r>
+              <a:rPr lang="en-US" sz="2400" dirty="0" smtClean="0">
+                <a:solidFill>
+                  <a:srgbClr val="FFFFFF"/>
+                </a:solidFill>
+                <a:latin typeface="Steinem"/>
+                <a:cs typeface="Steinem"/>
+              </a:rPr>
+              <a:t>Database creation and API use (MySQL, </a:t>
+            </a:r>
+            <a:r>
+              <a:rPr lang="en-US" sz="2400" dirty="0" err="1" smtClean="0">
+                <a:solidFill>
+                  <a:srgbClr val="FFFFFF"/>
+                </a:solidFill>
+                <a:latin typeface="Steinem"/>
+                <a:cs typeface="Steinem"/>
+              </a:rPr>
+              <a:t>DirectTextbook.com</a:t>
+            </a:r>
+            <a:r>
+              <a:rPr lang="en-US" sz="2400" dirty="0" smtClean="0">
+                <a:solidFill>
+                  <a:srgbClr val="FFFFFF"/>
+                </a:solidFill>
+                <a:latin typeface="Steinem"/>
+                <a:cs typeface="Steinem"/>
+              </a:rPr>
+              <a:t> API)</a:t>
+            </a:r>
+            <a:endParaRPr lang="en-US" sz="2400" b="0" dirty="0" smtClean="0">
+              <a:solidFill>
+                <a:srgbClr val="FFFFFF"/>
+              </a:solidFill>
+              <a:latin typeface="Steinem"/>
+              <a:cs typeface="Steinem"/>
+            </a:endParaRPr>
+          </a:p>
+          <a:p>
+            <a:pPr marL="342900" indent="-342900">
+              <a:buFont typeface="Arial"/>
+              <a:buChar char="•"/>
+            </a:pPr>
+            <a:r>
+              <a:rPr lang="en-US" sz="2400" b="0" dirty="0" smtClean="0">
+                <a:solidFill>
+                  <a:srgbClr val="FFFFFF"/>
+                </a:solidFill>
+                <a:latin typeface="Steinem"/>
+                <a:cs typeface="Steinem"/>
+              </a:rPr>
+              <a:t>October</a:t>
+            </a:r>
+          </a:p>
+          <a:p>
+            <a:pPr marL="800100" lvl="1" indent="-342900">
+              <a:buFont typeface="Arial"/>
+              <a:buChar char="•"/>
+            </a:pPr>
+            <a:r>
+              <a:rPr lang="en-US" sz="2400" dirty="0">
+                <a:solidFill>
+                  <a:srgbClr val="FFFFFF"/>
+                </a:solidFill>
+                <a:latin typeface="Steinem"/>
+                <a:cs typeface="Steinem"/>
+              </a:rPr>
+              <a:t>Backend (Java, </a:t>
+            </a:r>
+            <a:r>
+              <a:rPr lang="en-US" sz="2400" dirty="0" err="1">
+                <a:solidFill>
+                  <a:srgbClr val="FFFFFF"/>
+                </a:solidFill>
+                <a:latin typeface="Steinem"/>
+                <a:cs typeface="Steinem"/>
+              </a:rPr>
+              <a:t>Scala</a:t>
+            </a:r>
+            <a:r>
+              <a:rPr lang="en-US" sz="2400" dirty="0">
+                <a:solidFill>
+                  <a:srgbClr val="FFFFFF"/>
+                </a:solidFill>
+                <a:latin typeface="Steinem"/>
+                <a:cs typeface="Steinem"/>
+              </a:rPr>
+              <a:t>, Play Framework)</a:t>
+            </a:r>
+          </a:p>
+          <a:p>
+            <a:pPr marL="800100" lvl="1" indent="-342900">
+              <a:buFont typeface="Arial"/>
+              <a:buChar char="•"/>
+            </a:pPr>
+            <a:r>
+              <a:rPr lang="en-US" sz="2400" dirty="0">
+                <a:solidFill>
+                  <a:srgbClr val="FFFFFF"/>
+                </a:solidFill>
+                <a:latin typeface="Steinem"/>
+                <a:cs typeface="Steinem"/>
+              </a:rPr>
+              <a:t>Additions to frontend (Bootstrap, JavaScript, </a:t>
+            </a:r>
+            <a:r>
+              <a:rPr lang="en-US" sz="2400" dirty="0" err="1">
+                <a:solidFill>
+                  <a:srgbClr val="FFFFFF"/>
+                </a:solidFill>
+                <a:latin typeface="Steinem"/>
+                <a:cs typeface="Steinem"/>
+              </a:rPr>
+              <a:t>jQuery</a:t>
+            </a:r>
+            <a:r>
+              <a:rPr lang="en-US" sz="2400" dirty="0" smtClean="0">
+                <a:solidFill>
+                  <a:srgbClr val="FFFFFF"/>
+                </a:solidFill>
+                <a:latin typeface="Steinem"/>
+                <a:cs typeface="Steinem"/>
+              </a:rPr>
+              <a:t>)</a:t>
+            </a:r>
+            <a:endParaRPr lang="en-US" sz="2400" b="0" dirty="0" smtClean="0">
+              <a:solidFill>
+                <a:srgbClr val="FFFFFF"/>
+              </a:solidFill>
+              <a:latin typeface="Steinem"/>
+              <a:cs typeface="Steinem"/>
+            </a:endParaRPr>
+          </a:p>
+          <a:p>
+            <a:pPr marL="342900" indent="-342900">
+              <a:buFont typeface="Arial"/>
+              <a:buChar char="•"/>
+            </a:pPr>
+            <a:r>
+              <a:rPr lang="en-US" sz="2400" b="0" dirty="0" smtClean="0">
+                <a:solidFill>
+                  <a:srgbClr val="FFFFFF"/>
+                </a:solidFill>
+                <a:latin typeface="Steinem"/>
+                <a:cs typeface="Steinem"/>
+              </a:rPr>
+              <a:t>November &amp; December</a:t>
+            </a:r>
+          </a:p>
+          <a:p>
+            <a:pPr marL="800100" lvl="1" indent="-342900">
+              <a:buFont typeface="Arial"/>
+              <a:buChar char="•"/>
+            </a:pPr>
+            <a:r>
+              <a:rPr lang="en-US" sz="2400" dirty="0" smtClean="0">
+                <a:solidFill>
+                  <a:srgbClr val="FFFFFF"/>
+                </a:solidFill>
+                <a:latin typeface="Steinem"/>
+                <a:cs typeface="Steinem"/>
+              </a:rPr>
+              <a:t>Testing (Usability, Functionality, Fault)</a:t>
+            </a:r>
+          </a:p>
+          <a:p>
+            <a:pPr marL="800100" lvl="1" indent="-342900">
+              <a:buFont typeface="Arial"/>
+              <a:buChar char="•"/>
+            </a:pPr>
+            <a:r>
+              <a:rPr lang="en-US" sz="2400" b="0" dirty="0" smtClean="0">
+                <a:solidFill>
+                  <a:srgbClr val="FFFFFF"/>
+                </a:solidFill>
+                <a:latin typeface="Steinem"/>
+                <a:cs typeface="Steinem"/>
+              </a:rPr>
+              <a:t>Changes made as a result of testing done</a:t>
+            </a:r>
+            <a:endParaRPr lang="en-US" sz="2400" b="0" dirty="0" smtClean="0">
+              <a:solidFill>
+                <a:srgbClr val="FFFFFF"/>
+              </a:solidFill>
+              <a:latin typeface="Steinem"/>
+              <a:cs typeface="Steinem"/>
+            </a:endParaRPr>
+          </a:p>
+          <a:p>
+            <a:pPr lvl="1" indent="0">
+              <a:buNone/>
+            </a:pPr>
+            <a:endParaRPr lang="en-US" sz="2400" b="0" dirty="0" smtClean="0">
+              <a:solidFill>
+                <a:srgbClr val="FFFFFF"/>
+              </a:solidFill>
+              <a:latin typeface="Steinem"/>
+              <a:cs typeface="Steinem"/>
+            </a:endParaRPr>
+          </a:p>
+          <a:p>
+            <a:pPr marL="800100" lvl="1" indent="-342900">
+              <a:buFont typeface="Arial"/>
+              <a:buChar char="•"/>
+            </a:pPr>
+            <a:endParaRPr lang="en-US" sz="2400" b="0" dirty="0" smtClean="0">
+              <a:solidFill>
+                <a:srgbClr val="FFFFFF"/>
+              </a:solidFill>
+              <a:latin typeface="Steinem"/>
+              <a:cs typeface="Steinem"/>
+            </a:endParaRPr>
+          </a:p>
+          <a:p>
+            <a:pPr marL="800100" lvl="1" indent="-342900">
+              <a:buFont typeface="Arial"/>
+              <a:buChar char="•"/>
+            </a:pPr>
+            <a:endParaRPr lang="en-US" sz="2400" b="0" dirty="0" smtClean="0">
+              <a:solidFill>
+                <a:srgbClr val="FFFFFF"/>
+              </a:solidFill>
+              <a:latin typeface="Steinem"/>
+              <a:cs typeface="Steinem"/>
+            </a:endParaRPr>
+          </a:p>
+          <a:p>
+            <a:pPr marL="342900" indent="-342900">
+              <a:buFont typeface="Arial"/>
+              <a:buChar char="•"/>
+            </a:pPr>
+            <a:endParaRPr lang="en-US" dirty="0">
+              <a:solidFill>
+                <a:srgbClr val="FFFFFF"/>
+              </a:solidFill>
+              <a:latin typeface="Steinem"/>
+              <a:cs typeface="Steinem"/>
+            </a:endParaRPr>
+          </a:p>
+        </p:txBody>
+      </p:sp>
+    </p:spTree>
+    <p:extLst>
+      <p:ext uri="{BB962C8B-B14F-4D97-AF65-F5344CB8AC3E}">
+        <p14:creationId xmlns:p14="http://schemas.microsoft.com/office/powerpoint/2010/main" val="1390922999"/>
+      </p:ext>
+    </p:extLst>
+  </p:cSld>
+  <p:clrMapOvr>
+    <a:masterClrMapping/>
+  </p:clrMapOvr>
+</p:sld>
+</file>
+
+<file path=ppt/slides/slide7.xml><?xml version="1.0" encoding="utf-8"?>
 <p:sld xmlns:a="http://schemas.openxmlformats.org/drawingml/2006/main" xmlns:r="http://schemas.openxmlformats.org/officeDocument/2006/relationships" xmlns:p="http://schemas.openxmlformats.org/presentationml/2006/main">
   <p:cSld>
     <p:bg>

</xml_diff>